<commit_message>
Added examples based on 18.4
</commit_message>
<xml_diff>
--- a/Examples/templates/HelloWorld.pptx
+++ b/Examples/templates/HelloWorld.pptx
@@ -238,7 +238,7 @@
           <a:p>
             <a:fld id="{9483F04B-F71E-4D47-8F34-131E0D8DB3DC}" type="datetimeFigureOut">
               <a:rPr lang="en-US" smtClean="0"/>
-              <a:t>5/30/2016</a:t>
+              <a:t>5/12/2018</a:t>
             </a:fld>
             <a:endParaRPr lang="en-US"/>
           </a:p>
@@ -408,7 +408,7 @@
           <a:p>
             <a:fld id="{9483F04B-F71E-4D47-8F34-131E0D8DB3DC}" type="datetimeFigureOut">
               <a:rPr lang="en-US" smtClean="0"/>
-              <a:t>5/30/2016</a:t>
+              <a:t>5/12/2018</a:t>
             </a:fld>
             <a:endParaRPr lang="en-US"/>
           </a:p>
@@ -588,7 +588,7 @@
           <a:p>
             <a:fld id="{9483F04B-F71E-4D47-8F34-131E0D8DB3DC}" type="datetimeFigureOut">
               <a:rPr lang="en-US" smtClean="0"/>
-              <a:t>5/30/2016</a:t>
+              <a:t>5/12/2018</a:t>
             </a:fld>
             <a:endParaRPr lang="en-US"/>
           </a:p>
@@ -758,7 +758,7 @@
           <a:p>
             <a:fld id="{9483F04B-F71E-4D47-8F34-131E0D8DB3DC}" type="datetimeFigureOut">
               <a:rPr lang="en-US" smtClean="0"/>
-              <a:t>5/30/2016</a:t>
+              <a:t>5/12/2018</a:t>
             </a:fld>
             <a:endParaRPr lang="en-US"/>
           </a:p>
@@ -1004,7 +1004,7 @@
           <a:p>
             <a:fld id="{9483F04B-F71E-4D47-8F34-131E0D8DB3DC}" type="datetimeFigureOut">
               <a:rPr lang="en-US" smtClean="0"/>
-              <a:t>5/30/2016</a:t>
+              <a:t>5/12/2018</a:t>
             </a:fld>
             <a:endParaRPr lang="en-US"/>
           </a:p>
@@ -1236,7 +1236,7 @@
           <a:p>
             <a:fld id="{9483F04B-F71E-4D47-8F34-131E0D8DB3DC}" type="datetimeFigureOut">
               <a:rPr lang="en-US" smtClean="0"/>
-              <a:t>5/30/2016</a:t>
+              <a:t>5/12/2018</a:t>
             </a:fld>
             <a:endParaRPr lang="en-US"/>
           </a:p>
@@ -1603,7 +1603,7 @@
           <a:p>
             <a:fld id="{9483F04B-F71E-4D47-8F34-131E0D8DB3DC}" type="datetimeFigureOut">
               <a:rPr lang="en-US" smtClean="0"/>
-              <a:t>5/30/2016</a:t>
+              <a:t>5/12/2018</a:t>
             </a:fld>
             <a:endParaRPr lang="en-US"/>
           </a:p>
@@ -1721,7 +1721,7 @@
           <a:p>
             <a:fld id="{9483F04B-F71E-4D47-8F34-131E0D8DB3DC}" type="datetimeFigureOut">
               <a:rPr lang="en-US" smtClean="0"/>
-              <a:t>5/30/2016</a:t>
+              <a:t>5/12/2018</a:t>
             </a:fld>
             <a:endParaRPr lang="en-US"/>
           </a:p>
@@ -1816,7 +1816,7 @@
           <a:p>
             <a:fld id="{9483F04B-F71E-4D47-8F34-131E0D8DB3DC}" type="datetimeFigureOut">
               <a:rPr lang="en-US" smtClean="0"/>
-              <a:t>5/30/2016</a:t>
+              <a:t>5/12/2018</a:t>
             </a:fld>
             <a:endParaRPr lang="en-US"/>
           </a:p>
@@ -2093,7 +2093,7 @@
           <a:p>
             <a:fld id="{9483F04B-F71E-4D47-8F34-131E0D8DB3DC}" type="datetimeFigureOut">
               <a:rPr lang="en-US" smtClean="0"/>
-              <a:t>5/30/2016</a:t>
+              <a:t>5/12/2018</a:t>
             </a:fld>
             <a:endParaRPr lang="en-US"/>
           </a:p>
@@ -2346,7 +2346,7 @@
           <a:p>
             <a:fld id="{9483F04B-F71E-4D47-8F34-131E0D8DB3DC}" type="datetimeFigureOut">
               <a:rPr lang="en-US" smtClean="0"/>
-              <a:t>5/30/2016</a:t>
+              <a:t>5/12/2018</a:t>
             </a:fld>
             <a:endParaRPr lang="en-US"/>
           </a:p>
@@ -2559,7 +2559,7 @@
           <a:p>
             <a:fld id="{9483F04B-F71E-4D47-8F34-131E0D8DB3DC}" type="datetimeFigureOut">
               <a:rPr lang="en-US" smtClean="0"/>
-              <a:t>5/30/2016</a:t>
+              <a:t>5/12/2018</a:t>
             </a:fld>
             <a:endParaRPr lang="en-US"/>
           </a:p>
@@ -3014,7 +3014,15 @@
           <a:p>
             <a:r>
               <a:rPr lang="en-US" dirty="0" smtClean="0"/>
-              <a:t>Aspose.Slides for .NET</a:t>
+              <a:t>Aspose.Slides </a:t>
+            </a:r>
+            <a:r>
+              <a:rPr lang="en-US" smtClean="0"/>
+              <a:t>for </a:t>
+            </a:r>
+            <a:r>
+              <a:rPr lang="en-US" smtClean="0"/>
+              <a:t>C++</a:t>
             </a:r>
             <a:endParaRPr lang="en-US" dirty="0"/>
           </a:p>
@@ -3076,7 +3084,7 @@
     </a:clrScheme>
     <a:fontScheme name="Office">
       <a:majorFont>
-        <a:latin typeface="Calibri Light" panose="020F0302020204030204"/>
+        <a:latin typeface="Calibri Light"/>
         <a:ea typeface=""/>
         <a:cs typeface=""/>
         <a:font script="Jpan" typeface="ＭＳ Ｐゴシック"/>
@@ -3111,7 +3119,7 @@
         <a:font script="Geor" typeface="Sylfaen"/>
       </a:majorFont>
       <a:minorFont>
-        <a:latin typeface="Calibri" panose="020F0502020204030204"/>
+        <a:latin typeface="Calibri"/>
         <a:ea typeface=""/>
         <a:cs typeface=""/>
         <a:font script="Jpan" typeface="ＭＳ Ｐゴシック"/>
@@ -3288,7 +3296,7 @@
   <a:extraClrSchemeLst/>
   <a:extLst>
     <a:ext uri="{05A4C25C-085E-4340-85A3-A5531E510DB2}">
-      <thm15:themeFamily xmlns:thm15="http://schemas.microsoft.com/office/thememl/2012/main" name="Office Theme" id="{62F939B6-93AF-4DB8-9C6B-D6C7DFDC589F}" vid="{4A3C46E8-61CC-4603-A589-7422A47A8E4A}"/>
+      <thm15:themeFamily xmlns:thm15="http://schemas.microsoft.com/office/thememl/2012/main" xmlns="" name="Office Theme" id="{62F939B6-93AF-4DB8-9C6B-D6C7DFDC589F}" vid="{4A3C46E8-61CC-4603-A589-7422A47A8E4A}"/>
     </a:ext>
   </a:extLst>
 </a:theme>

</xml_diff>